<commit_message>
Update and correction PPTs
</commit_message>
<xml_diff>
--- a/docs/modules/ROOT/assets/attachments/Session2_ParallelProgramming_MPI.pptx
+++ b/docs/modules/ROOT/assets/attachments/Session2_ParallelProgramming_MPI.pptx
@@ -11400,7 +11400,7 @@
         <p:spPr>
           <a:xfrm>
             <a:off x="0" y="5400000"/>
-            <a:ext cx="10070280" cy="260280"/>
+            <a:ext cx="10069920" cy="259920"/>
           </a:xfrm>
           <a:prstGeom prst="rect">
             <a:avLst/>
@@ -11423,11 +11423,17 @@
             <a:noAutofit/>
           </a:bodyPr>
           <a:p>
+            <a:pPr>
+              <a:lnSpc>
+                <a:spcPct val="100000"/>
+              </a:lnSpc>
+            </a:pPr>
             <a:endParaRPr b="0" lang="fr-FR" sz="1800" spc="-1" strike="noStrike">
               <a:solidFill>
                 <a:srgbClr val="ffffff"/>
               </a:solidFill>
               <a:latin typeface="Arial"/>
+              <a:ea typeface="DejaVu Sans"/>
             </a:endParaRPr>
           </a:p>
         </p:txBody>
@@ -11441,7 +11447,7 @@
         <p:spPr>
           <a:xfrm>
             <a:off x="0" y="0"/>
-            <a:ext cx="10070280" cy="1205280"/>
+            <a:ext cx="10069920" cy="1204920"/>
           </a:xfrm>
           <a:prstGeom prst="rect">
             <a:avLst/>
@@ -11464,11 +11470,17 @@
             <a:noAutofit/>
           </a:bodyPr>
           <a:p>
+            <a:pPr>
+              <a:lnSpc>
+                <a:spcPct val="100000"/>
+              </a:lnSpc>
+            </a:pPr>
             <a:endParaRPr b="0" lang="fr-FR" sz="1800" spc="-1" strike="noStrike">
               <a:solidFill>
                 <a:srgbClr val="ffffff"/>
               </a:solidFill>
               <a:latin typeface="Arial"/>
+              <a:ea typeface="DejaVu Sans"/>
             </a:endParaRPr>
           </a:p>
         </p:txBody>
@@ -11486,7 +11498,7 @@
         <p:spPr>
           <a:xfrm>
             <a:off x="3420000" y="5400000"/>
-            <a:ext cx="3230280" cy="260280"/>
+            <a:ext cx="3229920" cy="259920"/>
           </a:xfrm>
           <a:prstGeom prst="rect">
             <a:avLst/>
@@ -11558,7 +11570,7 @@
         <p:spPr>
           <a:xfrm>
             <a:off x="360000" y="5400000"/>
-            <a:ext cx="2870280" cy="260280"/>
+            <a:ext cx="2869920" cy="259920"/>
           </a:xfrm>
           <a:prstGeom prst="rect">
             <a:avLst/>
@@ -11925,7 +11937,7 @@
         <p:spPr>
           <a:xfrm>
             <a:off x="0" y="5400000"/>
-            <a:ext cx="10068120" cy="258120"/>
+            <a:ext cx="10067760" cy="257760"/>
           </a:xfrm>
           <a:prstGeom prst="rect">
             <a:avLst/>
@@ -11948,11 +11960,17 @@
             <a:noAutofit/>
           </a:bodyPr>
           <a:p>
+            <a:pPr>
+              <a:lnSpc>
+                <a:spcPct val="100000"/>
+              </a:lnSpc>
+            </a:pPr>
             <a:endParaRPr b="0" lang="fr-FR" sz="1800" spc="-1" strike="noStrike">
               <a:solidFill>
                 <a:srgbClr val="ffffff"/>
               </a:solidFill>
               <a:latin typeface="Arial"/>
+              <a:ea typeface="DejaVu Sans"/>
             </a:endParaRPr>
           </a:p>
         </p:txBody>
@@ -11966,7 +11984,7 @@
         <p:spPr>
           <a:xfrm>
             <a:off x="0" y="0"/>
-            <a:ext cx="10068120" cy="1203120"/>
+            <a:ext cx="10067760" cy="1202760"/>
           </a:xfrm>
           <a:prstGeom prst="rect">
             <a:avLst/>
@@ -11989,11 +12007,17 @@
             <a:noAutofit/>
           </a:bodyPr>
           <a:p>
+            <a:pPr>
+              <a:lnSpc>
+                <a:spcPct val="100000"/>
+              </a:lnSpc>
+            </a:pPr>
             <a:endParaRPr b="0" lang="fr-FR" sz="1800" spc="-1" strike="noStrike">
               <a:solidFill>
                 <a:srgbClr val="ffffff"/>
               </a:solidFill>
               <a:latin typeface="Arial"/>
+              <a:ea typeface="DejaVu Sans"/>
             </a:endParaRPr>
           </a:p>
         </p:txBody>
@@ -12011,7 +12035,7 @@
         <p:spPr>
           <a:xfrm>
             <a:off x="3420000" y="5400000"/>
-            <a:ext cx="3228120" cy="258120"/>
+            <a:ext cx="3227760" cy="257760"/>
           </a:xfrm>
           <a:prstGeom prst="rect">
             <a:avLst/>
@@ -12083,7 +12107,7 @@
         <p:spPr>
           <a:xfrm>
             <a:off x="360000" y="5400000"/>
-            <a:ext cx="2868120" cy="258120"/>
+            <a:ext cx="2867760" cy="257760"/>
           </a:xfrm>
           <a:prstGeom prst="rect">
             <a:avLst/>
@@ -12450,7 +12474,7 @@
         <p:spPr>
           <a:xfrm>
             <a:off x="0" y="5400000"/>
-            <a:ext cx="10070640" cy="260640"/>
+            <a:ext cx="10070280" cy="260280"/>
           </a:xfrm>
           <a:prstGeom prst="rect">
             <a:avLst/>
@@ -12473,11 +12497,17 @@
             <a:noAutofit/>
           </a:bodyPr>
           <a:p>
+            <a:pPr>
+              <a:lnSpc>
+                <a:spcPct val="100000"/>
+              </a:lnSpc>
+            </a:pPr>
             <a:endParaRPr b="0" lang="fr-FR" sz="1800" spc="-1" strike="noStrike">
               <a:solidFill>
                 <a:srgbClr val="ffffff"/>
               </a:solidFill>
               <a:latin typeface="Arial"/>
+              <a:ea typeface="DejaVu Sans"/>
             </a:endParaRPr>
           </a:p>
         </p:txBody>
@@ -12491,7 +12521,7 @@
         <p:spPr>
           <a:xfrm>
             <a:off x="0" y="0"/>
-            <a:ext cx="10070640" cy="1205640"/>
+            <a:ext cx="10070280" cy="1205280"/>
           </a:xfrm>
           <a:prstGeom prst="rect">
             <a:avLst/>
@@ -12514,11 +12544,17 @@
             <a:noAutofit/>
           </a:bodyPr>
           <a:p>
+            <a:pPr>
+              <a:lnSpc>
+                <a:spcPct val="100000"/>
+              </a:lnSpc>
+            </a:pPr>
             <a:endParaRPr b="0" lang="fr-FR" sz="1800" spc="-1" strike="noStrike">
               <a:solidFill>
                 <a:srgbClr val="ffffff"/>
               </a:solidFill>
               <a:latin typeface="Arial"/>
+              <a:ea typeface="DejaVu Sans"/>
             </a:endParaRPr>
           </a:p>
         </p:txBody>
@@ -12536,7 +12572,7 @@
         <p:spPr>
           <a:xfrm>
             <a:off x="3420000" y="5400000"/>
-            <a:ext cx="3230640" cy="260640"/>
+            <a:ext cx="3230280" cy="260280"/>
           </a:xfrm>
           <a:prstGeom prst="rect">
             <a:avLst/>
@@ -12608,7 +12644,7 @@
         <p:spPr>
           <a:xfrm>
             <a:off x="360000" y="5400000"/>
-            <a:ext cx="2870640" cy="260640"/>
+            <a:ext cx="2870280" cy="260280"/>
           </a:xfrm>
           <a:prstGeom prst="rect">
             <a:avLst/>
@@ -12975,7 +13011,7 @@
         <p:spPr>
           <a:xfrm>
             <a:off x="0" y="5400000"/>
-            <a:ext cx="10070280" cy="260280"/>
+            <a:ext cx="10069920" cy="259920"/>
           </a:xfrm>
           <a:prstGeom prst="rect">
             <a:avLst/>
@@ -12998,11 +13034,17 @@
             <a:noAutofit/>
           </a:bodyPr>
           <a:p>
+            <a:pPr>
+              <a:lnSpc>
+                <a:spcPct val="100000"/>
+              </a:lnSpc>
+            </a:pPr>
             <a:endParaRPr b="0" lang="fr-FR" sz="1800" spc="-1" strike="noStrike">
               <a:solidFill>
                 <a:srgbClr val="ffffff"/>
               </a:solidFill>
               <a:latin typeface="Arial"/>
+              <a:ea typeface="DejaVu Sans"/>
             </a:endParaRPr>
           </a:p>
         </p:txBody>
@@ -13016,7 +13058,7 @@
         <p:spPr>
           <a:xfrm>
             <a:off x="0" y="0"/>
-            <a:ext cx="10070280" cy="1205280"/>
+            <a:ext cx="10069920" cy="1204920"/>
           </a:xfrm>
           <a:prstGeom prst="rect">
             <a:avLst/>
@@ -13039,11 +13081,17 @@
             <a:noAutofit/>
           </a:bodyPr>
           <a:p>
+            <a:pPr>
+              <a:lnSpc>
+                <a:spcPct val="100000"/>
+              </a:lnSpc>
+            </a:pPr>
             <a:endParaRPr b="0" lang="fr-FR" sz="1800" spc="-1" strike="noStrike">
               <a:solidFill>
                 <a:srgbClr val="ffffff"/>
               </a:solidFill>
               <a:latin typeface="Arial"/>
+              <a:ea typeface="DejaVu Sans"/>
             </a:endParaRPr>
           </a:p>
         </p:txBody>
@@ -13061,7 +13109,7 @@
         <p:spPr>
           <a:xfrm>
             <a:off x="3420000" y="5400000"/>
-            <a:ext cx="3230280" cy="260280"/>
+            <a:ext cx="3229920" cy="259920"/>
           </a:xfrm>
           <a:prstGeom prst="rect">
             <a:avLst/>
@@ -13133,7 +13181,7 @@
         <p:spPr>
           <a:xfrm>
             <a:off x="360000" y="5400000"/>
-            <a:ext cx="2870280" cy="260280"/>
+            <a:ext cx="2869920" cy="259920"/>
           </a:xfrm>
           <a:prstGeom prst="rect">
             <a:avLst/>
@@ -13500,7 +13548,7 @@
         <p:spPr>
           <a:xfrm>
             <a:off x="0" y="5400000"/>
-            <a:ext cx="10070280" cy="260280"/>
+            <a:ext cx="10069920" cy="259920"/>
           </a:xfrm>
           <a:prstGeom prst="rect">
             <a:avLst/>
@@ -13523,11 +13571,17 @@
             <a:noAutofit/>
           </a:bodyPr>
           <a:p>
+            <a:pPr>
+              <a:lnSpc>
+                <a:spcPct val="100000"/>
+              </a:lnSpc>
+            </a:pPr>
             <a:endParaRPr b="0" lang="fr-FR" sz="1800" spc="-1" strike="noStrike">
               <a:solidFill>
                 <a:srgbClr val="ffffff"/>
               </a:solidFill>
               <a:latin typeface="Arial"/>
+              <a:ea typeface="DejaVu Sans"/>
             </a:endParaRPr>
           </a:p>
         </p:txBody>
@@ -13541,7 +13595,7 @@
         <p:spPr>
           <a:xfrm>
             <a:off x="0" y="0"/>
-            <a:ext cx="10070280" cy="1205280"/>
+            <a:ext cx="10069920" cy="1204920"/>
           </a:xfrm>
           <a:prstGeom prst="rect">
             <a:avLst/>
@@ -13564,11 +13618,17 @@
             <a:noAutofit/>
           </a:bodyPr>
           <a:p>
+            <a:pPr>
+              <a:lnSpc>
+                <a:spcPct val="100000"/>
+              </a:lnSpc>
+            </a:pPr>
             <a:endParaRPr b="0" lang="fr-FR" sz="1800" spc="-1" strike="noStrike">
               <a:solidFill>
                 <a:srgbClr val="ffffff"/>
               </a:solidFill>
               <a:latin typeface="Arial"/>
+              <a:ea typeface="DejaVu Sans"/>
             </a:endParaRPr>
           </a:p>
         </p:txBody>
@@ -13586,7 +13646,7 @@
         <p:spPr>
           <a:xfrm>
             <a:off x="3420000" y="5400000"/>
-            <a:ext cx="3230280" cy="260280"/>
+            <a:ext cx="3229920" cy="259920"/>
           </a:xfrm>
           <a:prstGeom prst="rect">
             <a:avLst/>
@@ -13658,7 +13718,7 @@
         <p:spPr>
           <a:xfrm>
             <a:off x="360000" y="5400000"/>
-            <a:ext cx="2870280" cy="260280"/>
+            <a:ext cx="2869920" cy="259920"/>
           </a:xfrm>
           <a:prstGeom prst="rect">
             <a:avLst/>
@@ -14029,7 +14089,7 @@
         <p:spPr>
           <a:xfrm>
             <a:off x="0" y="0"/>
-            <a:ext cx="10149840" cy="4310280"/>
+            <a:ext cx="10149480" cy="4309920"/>
           </a:xfrm>
           <a:prstGeom prst="rect">
             <a:avLst/>
@@ -14048,7 +14108,7 @@
         <p:spPr>
           <a:xfrm>
             <a:off x="714600" y="4392000"/>
-            <a:ext cx="9350280" cy="710280"/>
+            <a:ext cx="9349920" cy="709920"/>
           </a:xfrm>
           <a:prstGeom prst="rect">
             <a:avLst/>
@@ -14132,15 +14192,15 @@
         <p:spPr>
           <a:xfrm>
             <a:off x="3240000" y="5055120"/>
-            <a:ext cx="3443400" cy="264960"/>
+            <a:ext cx="3443040" cy="264600"/>
           </a:xfrm>
           <a:custGeom>
             <a:avLst/>
             <a:gdLst>
-              <a:gd name="textAreaLeft" fmla="*/ 0 w 3443400"/>
-              <a:gd name="textAreaRight" fmla="*/ 3443760 w 3443400"/>
-              <a:gd name="textAreaTop" fmla="*/ 0 h 264960"/>
-              <a:gd name="textAreaBottom" fmla="*/ 265320 h 264960"/>
+              <a:gd name="textAreaLeft" fmla="*/ 0 w 3443040"/>
+              <a:gd name="textAreaRight" fmla="*/ 3443760 w 3443040"/>
+              <a:gd name="textAreaTop" fmla="*/ 0 h 264600"/>
+              <a:gd name="textAreaBottom" fmla="*/ 265320 h 264600"/>
             </a:gdLst>
             <a:ahLst/>
             <a:rect l="textAreaLeft" t="textAreaTop" r="textAreaRight" b="textAreaBottom"/>
@@ -14220,27 +14280,7 @@
                 <a:latin typeface="Arial"/>
                 <a:ea typeface="源ノ角ゴシック Normal"/>
               </a:rPr>
-              <a:t>Copyright 2023 Patrick </a:t>
-            </a:r>
-            <a:r>
-              <a:rPr b="0" lang="fr-FR" sz="1200" spc="-1" strike="noStrike">
-                <a:solidFill>
-                  <a:srgbClr val="000000"/>
-                </a:solidFill>
-                <a:latin typeface="Arial"/>
-                <a:ea typeface="源ノ角ゴシック Normal"/>
-              </a:rPr>
-              <a:t>Lemoine.</a:t>
-            </a:r>
-            <a:r>
-              <a:rPr b="0" lang="en-US" sz="1200" spc="-1" strike="noStrike">
-                <a:solidFill>
-                  <a:srgbClr val="000000"/>
-                </a:solidFill>
-                <a:latin typeface="Arial"/>
-                <a:ea typeface="源ノ角ゴシック Normal"/>
-              </a:rPr>
-              <a:t> All rights reserved.</a:t>
+              <a:t>By Patrick Lemoine 2023.</a:t>
             </a:r>
             <a:endParaRPr b="0" lang="fr-FR" sz="1200" spc="-1" strike="noStrike">
               <a:solidFill>
@@ -14290,7 +14330,7 @@
         <p:spPr>
           <a:xfrm>
             <a:off x="349920" y="225720"/>
-            <a:ext cx="9350280" cy="709200"/>
+            <a:ext cx="9349920" cy="708840"/>
           </a:xfrm>
           <a:prstGeom prst="rect">
             <a:avLst/>
@@ -14351,7 +14391,7 @@
         <p:spPr>
           <a:xfrm>
             <a:off x="8960760" y="108360"/>
-            <a:ext cx="954000" cy="954000"/>
+            <a:ext cx="953640" cy="953640"/>
           </a:xfrm>
           <a:prstGeom prst="rect">
             <a:avLst/>
@@ -14374,7 +14414,7 @@
         <p:spPr>
           <a:xfrm>
             <a:off x="120960" y="1458000"/>
-            <a:ext cx="6171840" cy="416160"/>
+            <a:ext cx="6171480" cy="415800"/>
           </a:xfrm>
           <a:prstGeom prst="rect">
             <a:avLst/>
@@ -14397,7 +14437,7 @@
         <p:spPr>
           <a:xfrm>
             <a:off x="538920" y="2736000"/>
-            <a:ext cx="6581880" cy="429480"/>
+            <a:ext cx="6581520" cy="429120"/>
           </a:xfrm>
           <a:prstGeom prst="rect">
             <a:avLst/>
@@ -14420,7 +14460,7 @@
         <p:spPr>
           <a:xfrm>
             <a:off x="1483200" y="4065840"/>
-            <a:ext cx="2325600" cy="462960"/>
+            <a:ext cx="2325240" cy="462600"/>
           </a:xfrm>
           <a:prstGeom prst="rect">
             <a:avLst/>
@@ -14443,7 +14483,7 @@
         <p:spPr>
           <a:xfrm>
             <a:off x="7376400" y="1726920"/>
-            <a:ext cx="2588400" cy="3053880"/>
+            <a:ext cx="2588040" cy="3053520"/>
           </a:xfrm>
           <a:prstGeom prst="rect">
             <a:avLst/>
@@ -14462,7 +14502,7 @@
         <p:spPr>
           <a:xfrm>
             <a:off x="187920" y="1881360"/>
-            <a:ext cx="5346000" cy="595440"/>
+            <a:ext cx="5345640" cy="595080"/>
           </a:xfrm>
           <a:prstGeom prst="rect">
             <a:avLst/>
@@ -14572,7 +14612,7 @@
         <p:spPr>
           <a:xfrm>
             <a:off x="601200" y="3172680"/>
-            <a:ext cx="3963600" cy="672840"/>
+            <a:ext cx="3963240" cy="672480"/>
           </a:xfrm>
           <a:prstGeom prst="rect">
             <a:avLst/>
@@ -14682,7 +14722,7 @@
         <p:spPr>
           <a:xfrm>
             <a:off x="1511280" y="4536000"/>
-            <a:ext cx="2657520" cy="595440"/>
+            <a:ext cx="2657160" cy="595080"/>
           </a:xfrm>
           <a:prstGeom prst="rect">
             <a:avLst/>
@@ -14789,7 +14829,7 @@
         <p:spPr>
           <a:xfrm>
             <a:off x="339480" y="226080"/>
-            <a:ext cx="9350280" cy="709200"/>
+            <a:ext cx="9349920" cy="708840"/>
           </a:xfrm>
           <a:prstGeom prst="rect">
             <a:avLst/>
@@ -14850,7 +14890,7 @@
         <p:spPr>
           <a:xfrm>
             <a:off x="8955360" y="108720"/>
-            <a:ext cx="954000" cy="954000"/>
+            <a:ext cx="953640" cy="953640"/>
           </a:xfrm>
           <a:prstGeom prst="rect">
             <a:avLst/>
@@ -14869,7 +14909,7 @@
         <p:spPr>
           <a:xfrm>
             <a:off x="4356000" y="2019600"/>
-            <a:ext cx="4483440" cy="2152800"/>
+            <a:ext cx="4483080" cy="2152800"/>
           </a:xfrm>
           <a:prstGeom prst="rect">
             <a:avLst/>
@@ -15775,7 +15815,7 @@
         <p:spPr>
           <a:xfrm>
             <a:off x="381600" y="1309680"/>
-            <a:ext cx="3617280" cy="3901320"/>
+            <a:ext cx="3616920" cy="3900960"/>
           </a:xfrm>
           <a:prstGeom prst="rect">
             <a:avLst/>
@@ -15798,7 +15838,7 @@
         <p:spPr>
           <a:xfrm>
             <a:off x="8280000" y="3773160"/>
-            <a:ext cx="1635480" cy="1507320"/>
+            <a:ext cx="1635120" cy="1506960"/>
           </a:xfrm>
           <a:prstGeom prst="rect">
             <a:avLst/>
@@ -15847,7 +15887,7 @@
         <p:spPr>
           <a:xfrm>
             <a:off x="339480" y="226080"/>
-            <a:ext cx="9350280" cy="709200"/>
+            <a:ext cx="9349920" cy="708840"/>
           </a:xfrm>
           <a:prstGeom prst="rect">
             <a:avLst/>
@@ -15908,7 +15948,7 @@
         <p:spPr>
           <a:xfrm>
             <a:off x="8955360" y="108720"/>
-            <a:ext cx="954000" cy="954000"/>
+            <a:ext cx="953640" cy="953640"/>
           </a:xfrm>
           <a:prstGeom prst="rect">
             <a:avLst/>
@@ -15931,7 +15971,7 @@
         <p:spPr>
           <a:xfrm>
             <a:off x="8280000" y="3773160"/>
-            <a:ext cx="1635480" cy="1507320"/>
+            <a:ext cx="1635120" cy="1506960"/>
           </a:xfrm>
           <a:prstGeom prst="rect">
             <a:avLst/>
@@ -15950,7 +15990,7 @@
         <p:spPr>
           <a:xfrm>
             <a:off x="4964040" y="1998720"/>
-            <a:ext cx="4071600" cy="2321280"/>
+            <a:ext cx="4071240" cy="2321280"/>
           </a:xfrm>
           <a:prstGeom prst="rect">
             <a:avLst/>
@@ -16719,7 +16759,7 @@
         <p:spPr>
           <a:xfrm>
             <a:off x="429840" y="1287360"/>
-            <a:ext cx="3592800" cy="3945960"/>
+            <a:ext cx="3592440" cy="3945600"/>
           </a:xfrm>
           <a:prstGeom prst="rect">
             <a:avLst/>
@@ -16768,7 +16808,7 @@
         <p:spPr>
           <a:xfrm>
             <a:off x="339480" y="226080"/>
-            <a:ext cx="9350280" cy="709200"/>
+            <a:ext cx="9349920" cy="708840"/>
           </a:xfrm>
           <a:prstGeom prst="rect">
             <a:avLst/>
@@ -16829,7 +16869,7 @@
         <p:spPr>
           <a:xfrm>
             <a:off x="8955360" y="108720"/>
-            <a:ext cx="954000" cy="954000"/>
+            <a:ext cx="953640" cy="953640"/>
           </a:xfrm>
           <a:prstGeom prst="rect">
             <a:avLst/>
@@ -16848,7 +16888,7 @@
         <p:spPr>
           <a:xfrm>
             <a:off x="591480" y="1163160"/>
-            <a:ext cx="9128160" cy="4404240"/>
+            <a:ext cx="9127800" cy="4404240"/>
           </a:xfrm>
           <a:prstGeom prst="rect">
             <a:avLst/>
@@ -18175,7 +18215,7 @@
         <p:spPr>
           <a:xfrm>
             <a:off x="339840" y="225720"/>
-            <a:ext cx="9350280" cy="709200"/>
+            <a:ext cx="9349920" cy="708840"/>
           </a:xfrm>
           <a:prstGeom prst="rect">
             <a:avLst/>
@@ -18236,7 +18276,7 @@
         <p:spPr>
           <a:xfrm>
             <a:off x="8960760" y="108360"/>
-            <a:ext cx="954000" cy="954000"/>
+            <a:ext cx="953640" cy="953640"/>
           </a:xfrm>
           <a:prstGeom prst="rect">
             <a:avLst/>
@@ -18259,7 +18299,7 @@
         <p:spPr>
           <a:xfrm>
             <a:off x="1979640" y="2556000"/>
-            <a:ext cx="6113160" cy="2537640"/>
+            <a:ext cx="6112800" cy="2537280"/>
           </a:xfrm>
           <a:prstGeom prst="rect">
             <a:avLst/>
@@ -18278,7 +18318,7 @@
         <p:spPr>
           <a:xfrm>
             <a:off x="1968840" y="1513440"/>
-            <a:ext cx="7311960" cy="1107360"/>
+            <a:ext cx="7311600" cy="1107000"/>
           </a:xfrm>
           <a:prstGeom prst="rect">
             <a:avLst/>
@@ -18601,7 +18641,7 @@
         <p:spPr>
           <a:xfrm>
             <a:off x="339840" y="225720"/>
-            <a:ext cx="9350280" cy="709200"/>
+            <a:ext cx="9349920" cy="708840"/>
           </a:xfrm>
           <a:prstGeom prst="rect">
             <a:avLst/>
@@ -18662,7 +18702,7 @@
         <p:spPr>
           <a:xfrm>
             <a:off x="8960760" y="108360"/>
-            <a:ext cx="954000" cy="954000"/>
+            <a:ext cx="953640" cy="953640"/>
           </a:xfrm>
           <a:prstGeom prst="rect">
             <a:avLst/>
@@ -18685,7 +18725,7 @@
         <p:spPr>
           <a:xfrm>
             <a:off x="2094480" y="1337760"/>
-            <a:ext cx="5614200" cy="480240"/>
+            <a:ext cx="5613840" cy="479880"/>
           </a:xfrm>
           <a:prstGeom prst="rect">
             <a:avLst/>
@@ -18708,7 +18748,7 @@
         <p:spPr>
           <a:xfrm>
             <a:off x="1793520" y="2944440"/>
-            <a:ext cx="6000480" cy="2268360"/>
+            <a:ext cx="6000120" cy="2268000"/>
           </a:xfrm>
           <a:prstGeom prst="rect">
             <a:avLst/>
@@ -18727,7 +18767,7 @@
         <p:spPr>
           <a:xfrm>
             <a:off x="1620000" y="1944000"/>
-            <a:ext cx="7019640" cy="595440"/>
+            <a:ext cx="7019280" cy="595080"/>
           </a:xfrm>
           <a:prstGeom prst="rect">
             <a:avLst/>
@@ -18851,7 +18891,7 @@
         <p:spPr>
           <a:xfrm>
             <a:off x="324000" y="2736000"/>
-            <a:ext cx="2506320" cy="1334160"/>
+            <a:ext cx="2505960" cy="1333800"/>
           </a:xfrm>
           <a:prstGeom prst="rect">
             <a:avLst/>
@@ -18900,7 +18940,7 @@
         <p:spPr>
           <a:xfrm>
             <a:off x="339840" y="225720"/>
-            <a:ext cx="9350280" cy="709200"/>
+            <a:ext cx="9349920" cy="708840"/>
           </a:xfrm>
           <a:prstGeom prst="rect">
             <a:avLst/>
@@ -18961,7 +19001,7 @@
         <p:spPr>
           <a:xfrm>
             <a:off x="8960760" y="108360"/>
-            <a:ext cx="954000" cy="954000"/>
+            <a:ext cx="953640" cy="953640"/>
           </a:xfrm>
           <a:prstGeom prst="rect">
             <a:avLst/>
@@ -18984,7 +19024,7 @@
         <p:spPr>
           <a:xfrm>
             <a:off x="2043360" y="1329120"/>
-            <a:ext cx="5716800" cy="713520"/>
+            <a:ext cx="5716440" cy="713160"/>
           </a:xfrm>
           <a:prstGeom prst="rect">
             <a:avLst/>
@@ -19007,7 +19047,7 @@
         <p:spPr>
           <a:xfrm>
             <a:off x="2023920" y="3008160"/>
-            <a:ext cx="5780880" cy="2168640"/>
+            <a:ext cx="5780520" cy="2168280"/>
           </a:xfrm>
           <a:prstGeom prst="rect">
             <a:avLst/>
@@ -19026,7 +19066,7 @@
         <p:spPr>
           <a:xfrm>
             <a:off x="396000" y="2056320"/>
-            <a:ext cx="9179640" cy="1147320"/>
+            <a:ext cx="9179280" cy="1146960"/>
           </a:xfrm>
           <a:prstGeom prst="rect">
             <a:avLst/>
@@ -19139,7 +19179,7 @@
         <p:spPr>
           <a:xfrm>
             <a:off x="8064000" y="4592160"/>
-            <a:ext cx="1799640" cy="339480"/>
+            <a:ext cx="1799280" cy="339120"/>
           </a:xfrm>
           <a:prstGeom prst="rect">
             <a:avLst/>
@@ -19246,7 +19286,7 @@
         <p:spPr>
           <a:xfrm>
             <a:off x="339840" y="225720"/>
-            <a:ext cx="9350280" cy="709200"/>
+            <a:ext cx="9349920" cy="708840"/>
           </a:xfrm>
           <a:prstGeom prst="rect">
             <a:avLst/>
@@ -19307,7 +19347,7 @@
         <p:spPr>
           <a:xfrm>
             <a:off x="8960760" y="108360"/>
-            <a:ext cx="954000" cy="954000"/>
+            <a:ext cx="953640" cy="953640"/>
           </a:xfrm>
           <a:prstGeom prst="rect">
             <a:avLst/>
@@ -19330,7 +19370,7 @@
         <p:spPr>
           <a:xfrm>
             <a:off x="2052000" y="1355400"/>
-            <a:ext cx="5699520" cy="660600"/>
+            <a:ext cx="5699160" cy="660240"/>
           </a:xfrm>
           <a:prstGeom prst="rect">
             <a:avLst/>
@@ -19353,7 +19393,7 @@
         <p:spPr>
           <a:xfrm>
             <a:off x="1977480" y="3070800"/>
-            <a:ext cx="5848560" cy="2178000"/>
+            <a:ext cx="5848200" cy="2177640"/>
           </a:xfrm>
           <a:prstGeom prst="rect">
             <a:avLst/>
@@ -19372,7 +19412,7 @@
         <p:spPr>
           <a:xfrm>
             <a:off x="1332000" y="2392200"/>
-            <a:ext cx="7991640" cy="415440"/>
+            <a:ext cx="7991280" cy="415080"/>
           </a:xfrm>
           <a:prstGeom prst="rect">
             <a:avLst/>
@@ -19404,6 +19444,7 @@
                   <a:srgbClr val="000000"/>
                 </a:solidFill>
                 <a:latin typeface="Times New Roman"/>
+                <a:ea typeface="DejaVu Sans"/>
               </a:rPr>
               <a:t>One “root” process send a different piece of the data to each one of the other Processes (inverse of gather)</a:t>
             </a:r>
@@ -19455,7 +19496,7 @@
         <p:spPr>
           <a:xfrm>
             <a:off x="339840" y="225720"/>
-            <a:ext cx="9350280" cy="709200"/>
+            <a:ext cx="9349920" cy="708840"/>
           </a:xfrm>
           <a:prstGeom prst="rect">
             <a:avLst/>
@@ -19516,7 +19557,7 @@
         <p:spPr>
           <a:xfrm>
             <a:off x="8960760" y="108360"/>
-            <a:ext cx="954000" cy="954000"/>
+            <a:ext cx="953640" cy="953640"/>
           </a:xfrm>
           <a:prstGeom prst="rect">
             <a:avLst/>
@@ -19539,7 +19580,7 @@
         <p:spPr>
           <a:xfrm>
             <a:off x="2128680" y="1277280"/>
-            <a:ext cx="5905800" cy="673200"/>
+            <a:ext cx="5905440" cy="672840"/>
           </a:xfrm>
           <a:prstGeom prst="rect">
             <a:avLst/>
@@ -19562,7 +19603,7 @@
         <p:spPr>
           <a:xfrm>
             <a:off x="8280000" y="3432600"/>
-            <a:ext cx="1073520" cy="1247040"/>
+            <a:ext cx="1073160" cy="1246680"/>
           </a:xfrm>
           <a:prstGeom prst="rect">
             <a:avLst/>
@@ -19581,7 +19622,7 @@
         <p:spPr>
           <a:xfrm>
             <a:off x="-3240000" y="-1800000"/>
-            <a:ext cx="4620600" cy="672840"/>
+            <a:ext cx="4620240" cy="672480"/>
           </a:xfrm>
           <a:prstGeom prst="rect">
             <a:avLst/>
@@ -19715,7 +19756,7 @@
         <p:spPr>
           <a:xfrm>
             <a:off x="2232000" y="3240000"/>
-            <a:ext cx="4852800" cy="2023200"/>
+            <a:ext cx="4852440" cy="2022840"/>
           </a:xfrm>
           <a:prstGeom prst="rect">
             <a:avLst/>
@@ -19734,7 +19775,7 @@
         <p:spPr>
           <a:xfrm>
             <a:off x="147240" y="1980000"/>
-            <a:ext cx="9752400" cy="1072800"/>
+            <a:ext cx="9752040" cy="1072440"/>
           </a:xfrm>
           <a:prstGeom prst="rect">
             <a:avLst/>
@@ -19766,6 +19807,7 @@
                   <a:srgbClr val="000000"/>
                 </a:solidFill>
                 <a:latin typeface="Times New Roman"/>
+                <a:ea typeface="DejaVu Sans"/>
               </a:rPr>
               <a:t>One root process collects data from all the other processes in the same communicator </a:t>
             </a:r>
@@ -19788,6 +19830,7 @@
                   <a:srgbClr val="000000"/>
                 </a:solidFill>
                 <a:latin typeface="Times New Roman"/>
+                <a:ea typeface="DejaVu Sans"/>
               </a:rPr>
               <a:t>and performs an operation on the received data.</a:t>
             </a:r>
@@ -19823,6 +19866,7 @@
                   <a:srgbClr val="000000"/>
                 </a:solidFill>
                 <a:latin typeface="Times New Roman"/>
+                <a:ea typeface="DejaVu Sans"/>
               </a:rPr>
               <a:t>Operations are: </a:t>
             </a:r>
@@ -19832,6 +19876,7 @@
                   <a:srgbClr val="000000"/>
                 </a:solidFill>
                 <a:latin typeface="Times New Roman"/>
+                <a:ea typeface="DejaVu Sans"/>
               </a:rPr>
               <a:t>MPI_SUM, MPI_MIN, MPI_MAX, MPI_PROD, logical AND, OR, XOR, and a few more</a:t>
             </a:r>
@@ -19854,6 +19899,7 @@
                   <a:srgbClr val="000000"/>
                 </a:solidFill>
                 <a:latin typeface="Times New Roman"/>
+                <a:ea typeface="DejaVu Sans"/>
               </a:rPr>
               <a:t>User can define own operation with MPI_Op_create()</a:t>
             </a:r>
@@ -19879,7 +19925,7 @@
         <p:spPr>
           <a:xfrm>
             <a:off x="5292000" y="3299040"/>
-            <a:ext cx="1619640" cy="1200600"/>
+            <a:ext cx="1619280" cy="1200240"/>
           </a:xfrm>
           <a:prstGeom prst="rect">
             <a:avLst/>
@@ -19928,7 +19974,7 @@
         <p:spPr>
           <a:xfrm>
             <a:off x="339840" y="225720"/>
-            <a:ext cx="9350280" cy="709200"/>
+            <a:ext cx="9349920" cy="708840"/>
           </a:xfrm>
           <a:prstGeom prst="rect">
             <a:avLst/>
@@ -19989,7 +20035,7 @@
         <p:spPr>
           <a:xfrm>
             <a:off x="8960760" y="108360"/>
-            <a:ext cx="954000" cy="954000"/>
+            <a:ext cx="953640" cy="953640"/>
           </a:xfrm>
           <a:prstGeom prst="rect">
             <a:avLst/>
@@ -20012,7 +20058,7 @@
         <p:spPr>
           <a:xfrm>
             <a:off x="2405520" y="1288800"/>
-            <a:ext cx="4992480" cy="650160"/>
+            <a:ext cx="4992120" cy="649800"/>
           </a:xfrm>
           <a:prstGeom prst="rect">
             <a:avLst/>
@@ -20035,7 +20081,7 @@
         <p:spPr>
           <a:xfrm>
             <a:off x="2071800" y="2700720"/>
-            <a:ext cx="5841000" cy="2512080"/>
+            <a:ext cx="5840640" cy="2511720"/>
           </a:xfrm>
           <a:prstGeom prst="rect">
             <a:avLst/>
@@ -20058,7 +20104,7 @@
         <p:spPr>
           <a:xfrm>
             <a:off x="7800480" y="1349280"/>
-            <a:ext cx="1012320" cy="1163520"/>
+            <a:ext cx="1011960" cy="1163160"/>
           </a:xfrm>
           <a:prstGeom prst="rect">
             <a:avLst/>
@@ -20077,7 +20123,7 @@
         <p:spPr>
           <a:xfrm>
             <a:off x="2893680" y="1944000"/>
-            <a:ext cx="4299120" cy="595440"/>
+            <a:ext cx="4298760" cy="595080"/>
           </a:xfrm>
           <a:prstGeom prst="rect">
             <a:avLst/>
@@ -20241,7 +20287,7 @@
         <p:spPr>
           <a:xfrm>
             <a:off x="360000" y="225720"/>
-            <a:ext cx="9348120" cy="707040"/>
+            <a:ext cx="9347760" cy="706680"/>
           </a:xfrm>
           <a:prstGeom prst="rect">
             <a:avLst/>
@@ -20296,7 +20342,7 @@
         <p:spPr>
           <a:xfrm>
             <a:off x="2379960" y="2414160"/>
-            <a:ext cx="6253920" cy="1827720"/>
+            <a:ext cx="6253560" cy="1827360"/>
           </a:xfrm>
           <a:prstGeom prst="rect">
             <a:avLst/>
@@ -20676,7 +20722,7 @@
         <p:spPr>
           <a:xfrm>
             <a:off x="1260000" y="2287800"/>
-            <a:ext cx="1071720" cy="2639520"/>
+            <a:ext cx="1071360" cy="2639160"/>
           </a:xfrm>
           <a:prstGeom prst="rect">
             <a:avLst/>
@@ -20695,15 +20741,15 @@
         <p:spPr>
           <a:xfrm>
             <a:off x="1599120" y="2103840"/>
-            <a:ext cx="1409040" cy="469440"/>
+            <a:ext cx="1408680" cy="469080"/>
           </a:xfrm>
           <a:custGeom>
             <a:avLst/>
             <a:gdLst>
-              <a:gd name="textAreaLeft" fmla="*/ 0 w 1409040"/>
-              <a:gd name="textAreaRight" fmla="*/ 1409400 w 1409040"/>
-              <a:gd name="textAreaTop" fmla="*/ 0 h 469440"/>
-              <a:gd name="textAreaBottom" fmla="*/ 469800 h 469440"/>
+              <a:gd name="textAreaLeft" fmla="*/ 0 w 1408680"/>
+              <a:gd name="textAreaRight" fmla="*/ 1409400 w 1408680"/>
+              <a:gd name="textAreaTop" fmla="*/ 0 h 469080"/>
+              <a:gd name="textAreaBottom" fmla="*/ 469800 h 469080"/>
             </a:gdLst>
             <a:ahLst/>
             <a:rect l="textAreaLeft" t="textAreaTop" r="textAreaRight" b="textAreaBottom"/>
@@ -20813,7 +20859,7 @@
         <p:spPr>
           <a:xfrm>
             <a:off x="8460000" y="1296000"/>
-            <a:ext cx="1501920" cy="495720"/>
+            <a:ext cx="1501560" cy="495360"/>
           </a:xfrm>
           <a:prstGeom prst="rect">
             <a:avLst/>
@@ -21027,7 +21073,7 @@
         <p:spPr>
           <a:xfrm>
             <a:off x="339840" y="225720"/>
-            <a:ext cx="9350280" cy="709200"/>
+            <a:ext cx="9349920" cy="708840"/>
           </a:xfrm>
           <a:prstGeom prst="rect">
             <a:avLst/>
@@ -21088,7 +21134,7 @@
         <p:spPr>
           <a:xfrm>
             <a:off x="8960760" y="108360"/>
-            <a:ext cx="954000" cy="954000"/>
+            <a:ext cx="953640" cy="953640"/>
           </a:xfrm>
           <a:prstGeom prst="rect">
             <a:avLst/>
@@ -21111,7 +21157,7 @@
         <p:spPr>
           <a:xfrm>
             <a:off x="2316600" y="1329480"/>
-            <a:ext cx="5169960" cy="496800"/>
+            <a:ext cx="5169600" cy="496440"/>
           </a:xfrm>
           <a:prstGeom prst="rect">
             <a:avLst/>
@@ -21134,7 +21180,7 @@
         <p:spPr>
           <a:xfrm>
             <a:off x="5798880" y="2574360"/>
-            <a:ext cx="4100760" cy="2285280"/>
+            <a:ext cx="4100400" cy="2284920"/>
           </a:xfrm>
           <a:prstGeom prst="rect">
             <a:avLst/>
@@ -21153,7 +21199,7 @@
         <p:spPr>
           <a:xfrm>
             <a:off x="2880000" y="3060000"/>
-            <a:ext cx="3635640" cy="1619640"/>
+            <a:ext cx="3635280" cy="1619280"/>
           </a:xfrm>
           <a:prstGeom prst="rect">
             <a:avLst/>
@@ -21329,7 +21375,7 @@
         <p:spPr>
           <a:xfrm>
             <a:off x="2052000" y="1970640"/>
-            <a:ext cx="5363640" cy="585000"/>
+            <a:ext cx="5363280" cy="584640"/>
           </a:xfrm>
           <a:prstGeom prst="rect">
             <a:avLst/>
@@ -21361,6 +21407,7 @@
                   <a:srgbClr val="000000"/>
                 </a:solidFill>
                 <a:latin typeface="Times New Roman"/>
+                <a:ea typeface="DejaVu Sans"/>
               </a:rPr>
               <a:t>When necessary, all the processes within a communicator can be forced to wait for each other although this operation can be expensive</a:t>
             </a:r>
@@ -21386,7 +21433,7 @@
         <p:spPr>
           <a:xfrm>
             <a:off x="19080" y="2772000"/>
-            <a:ext cx="2899440" cy="1595880"/>
+            <a:ext cx="2899080" cy="1595520"/>
           </a:xfrm>
           <a:prstGeom prst="rect">
             <a:avLst/>
@@ -21439,7 +21486,7 @@
         <p:spPr>
           <a:xfrm>
             <a:off x="360000" y="225720"/>
-            <a:ext cx="9350280" cy="709200"/>
+            <a:ext cx="9349920" cy="708840"/>
           </a:xfrm>
           <a:prstGeom prst="rect">
             <a:avLst/>
@@ -22642,7 +22689,7 @@
         <p:spPr>
           <a:xfrm>
             <a:off x="8640000" y="1298880"/>
-            <a:ext cx="1337040" cy="1069200"/>
+            <a:ext cx="1336680" cy="1068840"/>
           </a:xfrm>
           <a:prstGeom prst="rect">
             <a:avLst/>
@@ -22695,7 +22742,7 @@
         <p:spPr>
           <a:xfrm>
             <a:off x="360000" y="225720"/>
-            <a:ext cx="9350280" cy="709200"/>
+            <a:ext cx="9349920" cy="708840"/>
           </a:xfrm>
           <a:prstGeom prst="rect">
             <a:avLst/>
@@ -23849,7 +23896,7 @@
         <p:spPr>
           <a:xfrm>
             <a:off x="8640000" y="1262880"/>
-            <a:ext cx="1337040" cy="1069200"/>
+            <a:ext cx="1336680" cy="1068840"/>
           </a:xfrm>
           <a:prstGeom prst="rect">
             <a:avLst/>
@@ -23902,7 +23949,7 @@
         <p:spPr>
           <a:xfrm>
             <a:off x="360000" y="225720"/>
-            <a:ext cx="9350280" cy="709200"/>
+            <a:ext cx="9349920" cy="708840"/>
           </a:xfrm>
           <a:prstGeom prst="rect">
             <a:avLst/>
@@ -23957,7 +24004,7 @@
         <p:spPr>
           <a:xfrm>
             <a:off x="2051280" y="1384920"/>
-            <a:ext cx="6039720" cy="3862080"/>
+            <a:ext cx="6039360" cy="3861720"/>
           </a:xfrm>
           <a:prstGeom prst="rect">
             <a:avLst/>
@@ -23980,7 +24027,7 @@
         <p:spPr>
           <a:xfrm>
             <a:off x="8640000" y="1262880"/>
-            <a:ext cx="1337040" cy="1069200"/>
+            <a:ext cx="1336680" cy="1068840"/>
           </a:xfrm>
           <a:prstGeom prst="rect">
             <a:avLst/>
@@ -24033,7 +24080,7 @@
         <p:spPr>
           <a:xfrm>
             <a:off x="144000" y="1260000"/>
-            <a:ext cx="6559200" cy="4065840"/>
+            <a:ext cx="6558840" cy="4065480"/>
           </a:xfrm>
           <a:prstGeom prst="rect">
             <a:avLst/>
@@ -24052,7 +24099,7 @@
         <p:spPr>
           <a:xfrm>
             <a:off x="354960" y="225720"/>
-            <a:ext cx="9350280" cy="709200"/>
+            <a:ext cx="9349920" cy="708840"/>
           </a:xfrm>
           <a:prstGeom prst="rect">
             <a:avLst/>
@@ -24113,7 +24160,7 @@
         <p:spPr>
           <a:xfrm>
             <a:off x="6764400" y="1332000"/>
-            <a:ext cx="3126240" cy="1568520"/>
+            <a:ext cx="3125880" cy="1568160"/>
           </a:xfrm>
           <a:prstGeom prst="rect">
             <a:avLst/>
@@ -24136,7 +24183,7 @@
         <p:spPr>
           <a:xfrm>
             <a:off x="8960760" y="108360"/>
-            <a:ext cx="954000" cy="954000"/>
+            <a:ext cx="953640" cy="953640"/>
           </a:xfrm>
           <a:prstGeom prst="rect">
             <a:avLst/>
@@ -24185,7 +24232,7 @@
         <p:spPr>
           <a:xfrm>
             <a:off x="354960" y="225720"/>
-            <a:ext cx="9350280" cy="709200"/>
+            <a:ext cx="9349920" cy="708840"/>
           </a:xfrm>
           <a:prstGeom prst="rect">
             <a:avLst/>
@@ -24246,7 +24293,7 @@
         <p:spPr>
           <a:xfrm>
             <a:off x="8960760" y="108360"/>
-            <a:ext cx="954000" cy="954000"/>
+            <a:ext cx="953640" cy="953640"/>
           </a:xfrm>
           <a:prstGeom prst="rect">
             <a:avLst/>
@@ -24265,7 +24312,7 @@
         <p:spPr>
           <a:xfrm>
             <a:off x="540000" y="1175400"/>
-            <a:ext cx="8314920" cy="3716640"/>
+            <a:ext cx="8314560" cy="3716280"/>
           </a:xfrm>
           <a:prstGeom prst="rect">
             <a:avLst/>
@@ -24951,7 +24998,7 @@
         <p:spPr>
           <a:xfrm>
             <a:off x="354960" y="225720"/>
-            <a:ext cx="9350280" cy="709200"/>
+            <a:ext cx="9349920" cy="708840"/>
           </a:xfrm>
           <a:prstGeom prst="rect">
             <a:avLst/>
@@ -25012,7 +25059,7 @@
         <p:spPr>
           <a:xfrm>
             <a:off x="8960760" y="108360"/>
-            <a:ext cx="954000" cy="954000"/>
+            <a:ext cx="953640" cy="953640"/>
           </a:xfrm>
           <a:prstGeom prst="rect">
             <a:avLst/>
@@ -25031,7 +25078,7 @@
         <p:spPr>
           <a:xfrm>
             <a:off x="0" y="1224000"/>
-            <a:ext cx="6294600" cy="4128480"/>
+            <a:ext cx="6294240" cy="4128120"/>
           </a:xfrm>
           <a:prstGeom prst="rect">
             <a:avLst/>
@@ -25810,7 +25857,7 @@
         <p:spPr>
           <a:xfrm>
             <a:off x="4343760" y="1585440"/>
-            <a:ext cx="5550840" cy="1109160"/>
+            <a:ext cx="5550480" cy="1108800"/>
           </a:xfrm>
           <a:prstGeom prst="rect">
             <a:avLst/>
@@ -25904,7 +25951,7 @@
         <p:spPr>
           <a:xfrm>
             <a:off x="6294960" y="2520000"/>
-            <a:ext cx="2164680" cy="569880"/>
+            <a:ext cx="2164320" cy="569520"/>
           </a:xfrm>
           <a:prstGeom prst="rect">
             <a:avLst/>
@@ -25927,7 +25974,7 @@
         <p:spPr>
           <a:xfrm>
             <a:off x="8280000" y="3060000"/>
-            <a:ext cx="1589040" cy="2250000"/>
+            <a:ext cx="1588680" cy="2249640"/>
           </a:xfrm>
           <a:prstGeom prst="rect">
             <a:avLst/>
@@ -25976,7 +26023,7 @@
         <p:spPr>
           <a:xfrm>
             <a:off x="354960" y="225720"/>
-            <a:ext cx="9350280" cy="709200"/>
+            <a:ext cx="9349920" cy="708840"/>
           </a:xfrm>
           <a:prstGeom prst="rect">
             <a:avLst/>
@@ -26037,7 +26084,7 @@
         <p:spPr>
           <a:xfrm>
             <a:off x="8960760" y="108360"/>
-            <a:ext cx="954000" cy="954000"/>
+            <a:ext cx="953640" cy="953640"/>
           </a:xfrm>
           <a:prstGeom prst="rect">
             <a:avLst/>
@@ -26056,7 +26103,7 @@
         <p:spPr>
           <a:xfrm>
             <a:off x="540000" y="1348200"/>
-            <a:ext cx="9034200" cy="3661920"/>
+            <a:ext cx="9033840" cy="3661560"/>
           </a:xfrm>
           <a:prstGeom prst="rect">
             <a:avLst/>
@@ -26656,7 +26703,7 @@
         <p:spPr>
           <a:xfrm>
             <a:off x="4880520" y="1620000"/>
-            <a:ext cx="5015520" cy="676080"/>
+            <a:ext cx="5015160" cy="675720"/>
           </a:xfrm>
           <a:prstGeom prst="rect">
             <a:avLst/>
@@ -26767,7 +26814,7 @@
         <p:spPr>
           <a:xfrm>
             <a:off x="360000" y="225720"/>
-            <a:ext cx="9350280" cy="709200"/>
+            <a:ext cx="9349920" cy="708840"/>
           </a:xfrm>
           <a:prstGeom prst="rect">
             <a:avLst/>
@@ -26822,7 +26869,7 @@
         <p:spPr>
           <a:xfrm>
             <a:off x="540000" y="2340000"/>
-            <a:ext cx="9350280" cy="2043000"/>
+            <a:ext cx="9349920" cy="2042640"/>
           </a:xfrm>
           <a:prstGeom prst="rect">
             <a:avLst/>
@@ -27100,6 +27147,9 @@
                 <a:spcPts val="1417"/>
               </a:spcBef>
               <a:buNone/>
+              <a:tabLst>
+                <a:tab algn="l" pos="0"/>
+              </a:tabLst>
             </a:pPr>
             <a:endParaRPr b="0" lang="fr-FR" sz="3200" spc="-1" strike="noStrike">
               <a:solidFill>
@@ -27123,7 +27173,7 @@
         <p:spPr>
           <a:xfrm>
             <a:off x="8960760" y="108360"/>
-            <a:ext cx="954000" cy="954000"/>
+            <a:ext cx="953640" cy="953640"/>
           </a:xfrm>
           <a:prstGeom prst="rect">
             <a:avLst/>
@@ -27146,7 +27196,7 @@
         <p:spPr>
           <a:xfrm>
             <a:off x="7536600" y="2340000"/>
-            <a:ext cx="1635480" cy="1507320"/>
+            <a:ext cx="1635120" cy="1506960"/>
           </a:xfrm>
           <a:prstGeom prst="rect">
             <a:avLst/>
@@ -27199,7 +27249,7 @@
         <p:spPr>
           <a:xfrm>
             <a:off x="7943760" y="4543200"/>
-            <a:ext cx="1874520" cy="833760"/>
+            <a:ext cx="1874160" cy="833400"/>
           </a:xfrm>
           <a:prstGeom prst="rect">
             <a:avLst/>
@@ -27222,7 +27272,7 @@
         <p:spPr>
           <a:xfrm>
             <a:off x="2120400" y="2340000"/>
-            <a:ext cx="1471680" cy="1814760"/>
+            <a:ext cx="1471320" cy="1814400"/>
           </a:xfrm>
           <a:prstGeom prst="rect">
             <a:avLst/>
@@ -27241,15 +27291,15 @@
         <p:spPr>
           <a:xfrm>
             <a:off x="4174560" y="3054960"/>
-            <a:ext cx="3197520" cy="357120"/>
+            <a:ext cx="3197160" cy="356760"/>
           </a:xfrm>
           <a:custGeom>
             <a:avLst/>
             <a:gdLst>
-              <a:gd name="textAreaLeft" fmla="*/ 0 w 3197520"/>
-              <a:gd name="textAreaRight" fmla="*/ 3197880 w 3197520"/>
-              <a:gd name="textAreaTop" fmla="*/ 0 h 357120"/>
-              <a:gd name="textAreaBottom" fmla="*/ 357480 h 357120"/>
+              <a:gd name="textAreaLeft" fmla="*/ 0 w 3197160"/>
+              <a:gd name="textAreaRight" fmla="*/ 3197880 w 3197160"/>
+              <a:gd name="textAreaTop" fmla="*/ 0 h 356760"/>
+              <a:gd name="textAreaBottom" fmla="*/ 357480 h 356760"/>
             </a:gdLst>
             <a:ahLst/>
             <a:rect l="textAreaLeft" t="textAreaTop" r="textAreaRight" b="textAreaBottom"/>
@@ -27383,7 +27433,7 @@
         <p:spPr>
           <a:xfrm>
             <a:off x="360000" y="225720"/>
-            <a:ext cx="9350640" cy="709560"/>
+            <a:ext cx="9350280" cy="709200"/>
           </a:xfrm>
           <a:prstGeom prst="rect">
             <a:avLst/>
@@ -27438,7 +27488,7 @@
         <p:spPr>
           <a:xfrm>
             <a:off x="5076000" y="1620000"/>
-            <a:ext cx="4670640" cy="1611720"/>
+            <a:ext cx="4670280" cy="1611360"/>
           </a:xfrm>
           <a:prstGeom prst="rect">
             <a:avLst/>
@@ -27630,7 +27680,7 @@
         <p:spPr>
           <a:xfrm>
             <a:off x="51120" y="2448000"/>
-            <a:ext cx="4906080" cy="2065680"/>
+            <a:ext cx="4905720" cy="2065320"/>
           </a:xfrm>
           <a:prstGeom prst="rect">
             <a:avLst/>
@@ -27649,7 +27699,7 @@
         <p:spPr>
           <a:xfrm>
             <a:off x="5076000" y="3852000"/>
-            <a:ext cx="4670640" cy="1110240"/>
+            <a:ext cx="4670280" cy="1109880"/>
           </a:xfrm>
           <a:prstGeom prst="rect">
             <a:avLst/>
@@ -27756,7 +27806,7 @@
         <p:spPr>
           <a:xfrm>
             <a:off x="0" y="1237680"/>
-            <a:ext cx="1254240" cy="801360"/>
+            <a:ext cx="1253880" cy="801000"/>
           </a:xfrm>
           <a:prstGeom prst="rect">
             <a:avLst/>
@@ -27775,7 +27825,7 @@
         <p:spPr>
           <a:xfrm>
             <a:off x="1116000" y="1404000"/>
-            <a:ext cx="1614240" cy="354240"/>
+            <a:ext cx="1613880" cy="353880"/>
           </a:xfrm>
           <a:prstGeom prst="rect">
             <a:avLst/>
@@ -27913,7 +27963,7 @@
         <p:spPr>
           <a:xfrm>
             <a:off x="2064600" y="2988000"/>
-            <a:ext cx="6170400" cy="916920"/>
+            <a:ext cx="6170040" cy="916560"/>
           </a:xfrm>
           <a:prstGeom prst="rect">
             <a:avLst/>
@@ -28066,7 +28116,7 @@
         <p:spPr>
           <a:xfrm>
             <a:off x="1584000" y="2484360"/>
-            <a:ext cx="1417680" cy="1401480"/>
+            <a:ext cx="1417320" cy="1401120"/>
           </a:xfrm>
           <a:prstGeom prst="rect">
             <a:avLst/>
@@ -28089,7 +28139,7 @@
         <p:spPr>
           <a:xfrm>
             <a:off x="4140000" y="3802680"/>
-            <a:ext cx="1769040" cy="941400"/>
+            <a:ext cx="1768680" cy="941040"/>
           </a:xfrm>
           <a:prstGeom prst="rect">
             <a:avLst/>
@@ -28112,7 +28162,7 @@
         <p:spPr>
           <a:xfrm>
             <a:off x="7560000" y="2150280"/>
-            <a:ext cx="2017800" cy="2017800"/>
+            <a:ext cx="2017440" cy="2017440"/>
           </a:xfrm>
           <a:prstGeom prst="rect">
             <a:avLst/>
@@ -28165,7 +28215,7 @@
         <p:spPr>
           <a:xfrm>
             <a:off x="360000" y="225720"/>
-            <a:ext cx="9350280" cy="709200"/>
+            <a:ext cx="9349920" cy="708840"/>
           </a:xfrm>
           <a:prstGeom prst="rect">
             <a:avLst/>
@@ -28216,7 +28266,7 @@
         <p:spPr>
           <a:xfrm>
             <a:off x="180000" y="1433880"/>
-            <a:ext cx="9179640" cy="2841120"/>
+            <a:ext cx="9179280" cy="2840760"/>
           </a:xfrm>
           <a:prstGeom prst="rect">
             <a:avLst/>
@@ -28568,7 +28618,7 @@
         <p:spPr>
           <a:xfrm>
             <a:off x="8408880" y="3856320"/>
-            <a:ext cx="1635480" cy="1507320"/>
+            <a:ext cx="1635120" cy="1506960"/>
           </a:xfrm>
           <a:prstGeom prst="rect">
             <a:avLst/>
@@ -28591,7 +28641,7 @@
         <p:spPr>
           <a:xfrm>
             <a:off x="3492000" y="3899160"/>
-            <a:ext cx="3195360" cy="1392480"/>
+            <a:ext cx="3195000" cy="1392120"/>
           </a:xfrm>
           <a:prstGeom prst="rect">
             <a:avLst/>
@@ -28644,7 +28694,7 @@
         <p:spPr>
           <a:xfrm>
             <a:off x="360000" y="225720"/>
-            <a:ext cx="9350280" cy="709200"/>
+            <a:ext cx="9349920" cy="708840"/>
           </a:xfrm>
           <a:prstGeom prst="rect">
             <a:avLst/>
@@ -28699,7 +28749,7 @@
         <p:spPr>
           <a:xfrm>
             <a:off x="8960760" y="108360"/>
-            <a:ext cx="954000" cy="954000"/>
+            <a:ext cx="953640" cy="953640"/>
           </a:xfrm>
           <a:prstGeom prst="rect">
             <a:avLst/>
@@ -28722,7 +28772,7 @@
         <p:spPr>
           <a:xfrm>
             <a:off x="1773360" y="2170800"/>
-            <a:ext cx="6256440" cy="470160"/>
+            <a:ext cx="6256080" cy="469800"/>
           </a:xfrm>
           <a:prstGeom prst="rect">
             <a:avLst/>
@@ -28745,7 +28795,7 @@
         <p:spPr>
           <a:xfrm>
             <a:off x="1800000" y="3780000"/>
-            <a:ext cx="6256440" cy="477000"/>
+            <a:ext cx="6256080" cy="476640"/>
           </a:xfrm>
           <a:prstGeom prst="rect">
             <a:avLst/>
@@ -28764,7 +28814,7 @@
         <p:spPr>
           <a:xfrm>
             <a:off x="1823760" y="2608200"/>
-            <a:ext cx="5436000" cy="1107360"/>
+            <a:ext cx="5435640" cy="1107000"/>
           </a:xfrm>
           <a:prstGeom prst="rect">
             <a:avLst/>
@@ -28907,7 +28957,7 @@
         <p:spPr>
           <a:xfrm>
             <a:off x="1872000" y="4221360"/>
-            <a:ext cx="3078360" cy="595440"/>
+            <a:ext cx="3078000" cy="595080"/>
           </a:xfrm>
           <a:prstGeom prst="rect">
             <a:avLst/>
@@ -29044,7 +29094,7 @@
         <p:spPr>
           <a:xfrm>
             <a:off x="1452240" y="1548000"/>
-            <a:ext cx="7545600" cy="344520"/>
+            <a:ext cx="7545240" cy="344160"/>
           </a:xfrm>
           <a:prstGeom prst="rect">
             <a:avLst/>
@@ -29172,7 +29222,7 @@
         <p:spPr>
           <a:xfrm>
             <a:off x="360000" y="225720"/>
-            <a:ext cx="9350280" cy="709200"/>
+            <a:ext cx="9349920" cy="708840"/>
           </a:xfrm>
           <a:prstGeom prst="rect">
             <a:avLst/>
@@ -29227,7 +29277,7 @@
         <p:spPr>
           <a:xfrm>
             <a:off x="8960760" y="108360"/>
-            <a:ext cx="954000" cy="954000"/>
+            <a:ext cx="953640" cy="953640"/>
           </a:xfrm>
           <a:prstGeom prst="rect">
             <a:avLst/>
@@ -29250,7 +29300,7 @@
         <p:spPr>
           <a:xfrm>
             <a:off x="1585440" y="1712880"/>
-            <a:ext cx="6632280" cy="449640"/>
+            <a:ext cx="6631920" cy="449280"/>
           </a:xfrm>
           <a:prstGeom prst="rect">
             <a:avLst/>
@@ -29273,7 +29323,7 @@
         <p:spPr>
           <a:xfrm>
             <a:off x="1592640" y="3253680"/>
-            <a:ext cx="6617880" cy="464040"/>
+            <a:ext cx="6617520" cy="463680"/>
           </a:xfrm>
           <a:prstGeom prst="rect">
             <a:avLst/>
@@ -29292,7 +29342,7 @@
         <p:spPr>
           <a:xfrm>
             <a:off x="1620000" y="2196000"/>
-            <a:ext cx="4929840" cy="1107360"/>
+            <a:ext cx="4929480" cy="1107000"/>
           </a:xfrm>
           <a:prstGeom prst="rect">
             <a:avLst/>
@@ -29435,7 +29485,7 @@
         <p:spPr>
           <a:xfrm>
             <a:off x="1656000" y="3753360"/>
-            <a:ext cx="4042800" cy="595440"/>
+            <a:ext cx="4042440" cy="595080"/>
           </a:xfrm>
           <a:prstGeom prst="rect">
             <a:avLst/>
@@ -29546,7 +29596,7 @@
         <p:spPr>
           <a:xfrm>
             <a:off x="360000" y="225720"/>
-            <a:ext cx="9350280" cy="709200"/>
+            <a:ext cx="9349920" cy="708840"/>
           </a:xfrm>
           <a:prstGeom prst="rect">
             <a:avLst/>
@@ -29601,7 +29651,7 @@
         <p:spPr>
           <a:xfrm>
             <a:off x="8437320" y="3884760"/>
-            <a:ext cx="1635480" cy="1507320"/>
+            <a:ext cx="1635120" cy="1506960"/>
           </a:xfrm>
           <a:prstGeom prst="rect">
             <a:avLst/>
@@ -29620,7 +29670,7 @@
         <p:spPr>
           <a:xfrm>
             <a:off x="324000" y="1656000"/>
-            <a:ext cx="9539640" cy="2905920"/>
+            <a:ext cx="9539280" cy="2905560"/>
           </a:xfrm>
           <a:prstGeom prst="rect">
             <a:avLst/>
@@ -29658,6 +29708,7 @@
                   <a:srgbClr val="000000"/>
                 </a:solidFill>
                 <a:latin typeface="Times New Roman"/>
+                <a:ea typeface="DejaVu Sans"/>
               </a:rPr>
               <a:t>A communicator is an identifier associated with a group of processes </a:t>
             </a:r>
@@ -29680,6 +29731,7 @@
                   <a:srgbClr val="000000"/>
                 </a:solidFill>
                 <a:latin typeface="Times New Roman"/>
+                <a:ea typeface="DejaVu Sans"/>
               </a:rPr>
               <a:t>– </a:t>
             </a:r>
@@ -29689,6 +29741,7 @@
                   <a:srgbClr val="000000"/>
                 </a:solidFill>
                 <a:latin typeface="Times New Roman"/>
+                <a:ea typeface="DejaVu Sans"/>
               </a:rPr>
               <a:t>Each process has a unique rank within a specific communicator </a:t>
             </a:r>
@@ -29711,6 +29764,7 @@
                   <a:srgbClr val="000000"/>
                 </a:solidFill>
                 <a:latin typeface="Times New Roman"/>
+                <a:ea typeface="DejaVu Sans"/>
               </a:rPr>
               <a:t>   </a:t>
             </a:r>
@@ -29720,6 +29774,7 @@
                   <a:srgbClr val="000000"/>
                 </a:solidFill>
                 <a:latin typeface="Times New Roman"/>
+                <a:ea typeface="DejaVu Sans"/>
               </a:rPr>
               <a:t>(the rank starts from 0 and has a maximum value of (nprocesses-1) ). </a:t>
             </a:r>
@@ -29742,6 +29797,7 @@
                   <a:srgbClr val="000000"/>
                 </a:solidFill>
                 <a:latin typeface="Times New Roman"/>
+                <a:ea typeface="DejaVu Sans"/>
               </a:rPr>
               <a:t>– </a:t>
             </a:r>
@@ -29751,6 +29807,7 @@
                   <a:srgbClr val="000000"/>
                 </a:solidFill>
                 <a:latin typeface="Times New Roman"/>
+                <a:ea typeface="DejaVu Sans"/>
               </a:rPr>
               <a:t>Internal mapping of processes to processing units </a:t>
             </a:r>
@@ -29773,6 +29830,7 @@
                   <a:srgbClr val="000000"/>
                 </a:solidFill>
                 <a:latin typeface="Times New Roman"/>
+                <a:ea typeface="DejaVu Sans"/>
               </a:rPr>
               <a:t>– </a:t>
             </a:r>
@@ -29782,6 +29840,7 @@
                   <a:srgbClr val="000000"/>
                 </a:solidFill>
                 <a:latin typeface="Times New Roman"/>
+                <a:ea typeface="DejaVu Sans"/>
               </a:rPr>
               <a:t>Always required when initiating a communication by calling an MPI function or routine.</a:t>
             </a:r>
@@ -29804,6 +29863,7 @@
                   <a:srgbClr val="000000"/>
                 </a:solidFill>
                 <a:latin typeface="Times New Roman"/>
+                <a:ea typeface="DejaVu Sans"/>
               </a:rPr>
               <a:t> </a:t>
             </a:r>
@@ -29832,9 +29892,23 @@
                   <a:srgbClr val="000000"/>
                 </a:solidFill>
                 <a:latin typeface="Times New Roman"/>
+                <a:ea typeface="DejaVu Sans"/>
               </a:rPr>
               <a:t>Default communicator MPI_COMM_WORLD, which contains all available processes.</a:t>
             </a:r>
+            <a:endParaRPr b="0" lang="fr-FR" sz="1600" spc="-1" strike="noStrike">
+              <a:solidFill>
+                <a:srgbClr val="000000"/>
+              </a:solidFill>
+              <a:latin typeface="Arial"/>
+            </a:endParaRPr>
+          </a:p>
+          <a:p>
+            <a:pPr>
+              <a:lnSpc>
+                <a:spcPct val="100000"/>
+              </a:lnSpc>
+            </a:pPr>
             <a:endParaRPr b="0" lang="fr-FR" sz="1600" spc="-1" strike="noStrike">
               <a:solidFill>
                 <a:srgbClr val="000000"/>
@@ -29854,31 +29928,13 @@
               <a:buFont typeface="Wingdings" charset="2"/>
               <a:buChar char=""/>
             </a:pPr>
-            <a:endParaRPr b="0" lang="fr-FR" sz="1600" spc="-1" strike="noStrike">
-              <a:solidFill>
-                <a:srgbClr val="000000"/>
-              </a:solidFill>
-              <a:latin typeface="Arial"/>
-            </a:endParaRPr>
-          </a:p>
-          <a:p>
-            <a:pPr marL="216000" indent="-216000">
-              <a:lnSpc>
-                <a:spcPct val="100000"/>
-              </a:lnSpc>
-              <a:buClr>
-                <a:srgbClr val="000000"/>
-              </a:buClr>
-              <a:buSzPct val="45000"/>
-              <a:buFont typeface="Wingdings" charset="2"/>
-              <a:buChar char=""/>
-            </a:pPr>
             <a:r>
               <a:rPr b="0" lang="en-US" sz="1600" spc="-1" strike="noStrike">
                 <a:solidFill>
                   <a:srgbClr val="000000"/>
                 </a:solidFill>
                 <a:latin typeface="Times New Roman"/>
+                <a:ea typeface="DejaVu Sans"/>
               </a:rPr>
               <a:t>Several</a:t>
             </a:r>
@@ -29888,6 +29944,7 @@
                   <a:srgbClr val="000000"/>
                 </a:solidFill>
                 <a:latin typeface="Times New Roman"/>
+                <a:ea typeface="DejaVu Sans"/>
               </a:rPr>
               <a:t> </a:t>
             </a:r>
@@ -29897,6 +29954,7 @@
                   <a:srgbClr val="000000"/>
                 </a:solidFill>
                 <a:latin typeface="Times New Roman"/>
+                <a:ea typeface="DejaVu Sans"/>
               </a:rPr>
               <a:t>communicators</a:t>
             </a:r>
@@ -29906,6 +29964,7 @@
                   <a:srgbClr val="000000"/>
                 </a:solidFill>
                 <a:latin typeface="Times New Roman"/>
+                <a:ea typeface="DejaVu Sans"/>
               </a:rPr>
               <a:t> </a:t>
             </a:r>
@@ -29915,6 +29974,7 @@
                   <a:srgbClr val="000000"/>
                 </a:solidFill>
                 <a:latin typeface="Times New Roman"/>
+                <a:ea typeface="DejaVu Sans"/>
               </a:rPr>
               <a:t>can</a:t>
             </a:r>
@@ -29924,6 +29984,7 @@
                   <a:srgbClr val="000000"/>
                 </a:solidFill>
                 <a:latin typeface="Times New Roman"/>
+                <a:ea typeface="DejaVu Sans"/>
               </a:rPr>
               <a:t> </a:t>
             </a:r>
@@ -29933,6 +29994,7 @@
                   <a:srgbClr val="000000"/>
                 </a:solidFill>
                 <a:latin typeface="Times New Roman"/>
+                <a:ea typeface="DejaVu Sans"/>
               </a:rPr>
               <a:t>coexist</a:t>
             </a:r>
@@ -29942,6 +30004,7 @@
                   <a:srgbClr val="000000"/>
                 </a:solidFill>
                 <a:latin typeface="Times New Roman"/>
+                <a:ea typeface="DejaVu Sans"/>
               </a:rPr>
               <a:t> </a:t>
             </a:r>
@@ -29977,6 +30040,7 @@
                   <a:srgbClr val="000000"/>
                 </a:solidFill>
                 <a:latin typeface="Times New Roman"/>
+                <a:ea typeface="DejaVu Sans"/>
               </a:rPr>
               <a:t>       – </a:t>
             </a:r>
@@ -29986,6 +30050,7 @@
                   <a:srgbClr val="000000"/>
                 </a:solidFill>
                 <a:latin typeface="Times New Roman"/>
+                <a:ea typeface="DejaVu Sans"/>
               </a:rPr>
               <a:t>A process can belong to different communicators at the same time, </a:t>
             </a:r>
@@ -30008,6 +30073,7 @@
                   <a:srgbClr val="000000"/>
                 </a:solidFill>
                 <a:latin typeface="Times New Roman"/>
+                <a:ea typeface="DejaVu Sans"/>
               </a:rPr>
               <a:t>          </a:t>
             </a:r>
@@ -30017,6 +30083,7 @@
                   <a:srgbClr val="000000"/>
                 </a:solidFill>
                 <a:latin typeface="Times New Roman"/>
+                <a:ea typeface="DejaVu Sans"/>
               </a:rPr>
               <a:t>but has a unique rank in each communicator </a:t>
             </a:r>
@@ -30068,7 +30135,7 @@
         <p:spPr>
           <a:xfrm>
             <a:off x="354600" y="226080"/>
-            <a:ext cx="9350280" cy="709200"/>
+            <a:ext cx="9349920" cy="708840"/>
           </a:xfrm>
           <a:prstGeom prst="rect">
             <a:avLst/>
@@ -30103,6 +30170,7 @@
                   <a:srgbClr val="ffffff"/>
                 </a:solidFill>
                 <a:latin typeface="Source Sans Pro Black"/>
+                <a:ea typeface="DejaVu Sans"/>
               </a:rPr>
               <a:t>MPI : Basic calls to exchange data</a:t>
             </a:r>
@@ -30124,7 +30192,7 @@
         <p:spPr>
           <a:xfrm>
             <a:off x="356040" y="1650600"/>
-            <a:ext cx="7923600" cy="2955960"/>
+            <a:ext cx="7923240" cy="2955960"/>
           </a:xfrm>
           <a:prstGeom prst="rect">
             <a:avLst/>
@@ -30183,7 +30251,7 @@
               <a:t>Point</a:t>
             </a:r>
             <a:r>
-              <a:rPr b="0" lang="fr-CH" sz="1600" spc="35" strike="noStrike">
+              <a:rPr b="0" lang="fr-CH" sz="1600" spc="32" strike="noStrike">
                 <a:solidFill>
                   <a:srgbClr val="000000"/>
                 </a:solidFill>
@@ -31236,7 +31304,7 @@
               <a:t>:</a:t>
             </a:r>
             <a:r>
-              <a:rPr b="0" lang="fr-CH" sz="1600" spc="9" strike="noStrike">
+              <a:rPr b="0" lang="fr-CH" sz="1600" spc="7" strike="noStrike">
                 <a:solidFill>
                   <a:srgbClr val="000000"/>
                 </a:solidFill>
@@ -31277,7 +31345,7 @@
         <p:spPr>
           <a:xfrm>
             <a:off x="8437320" y="3884760"/>
-            <a:ext cx="1635480" cy="1507320"/>
+            <a:ext cx="1635120" cy="1506960"/>
           </a:xfrm>
           <a:prstGeom prst="rect">
             <a:avLst/>

</xml_diff>